<commit_message>
Added Testing Methods and Hardware info to the poster draft, while also editing our requirements doc, as it was dated...
</commit_message>
<xml_diff>
--- a/docs/poster/grp50_poster.pptx
+++ b/docs/poster/grp50_poster.pptx
@@ -238,7 +238,7 @@
           <a:p>
             <a:fld id="{7395F848-6DDA-9042-95D4-0071278BB24B}" type="datetimeFigureOut">
               <a:rPr lang="en-US" smtClean="0"/>
-              <a:t>3/12/2017</a:t>
+              <a:t>3/16/17</a:t>
             </a:fld>
             <a:endParaRPr lang="en-US"/>
           </a:p>
@@ -1386,7 +1386,7 @@
           <a:p>
             <a:fld id="{56B6BD69-149A-CD41-9E7C-E241C9398BA0}" type="datetimeFigureOut">
               <a:rPr lang="en-US" smtClean="0"/>
-              <a:t>3/12/2017</a:t>
+              <a:t>3/16/17</a:t>
             </a:fld>
             <a:endParaRPr lang="en-US"/>
           </a:p>
@@ -1564,7 +1564,7 @@
           <a:p>
             <a:fld id="{56B6BD69-149A-CD41-9E7C-E241C9398BA0}" type="datetimeFigureOut">
               <a:rPr lang="en-US" smtClean="0"/>
-              <a:t>3/12/2017</a:t>
+              <a:t>3/16/17</a:t>
             </a:fld>
             <a:endParaRPr lang="en-US"/>
           </a:p>
@@ -1732,7 +1732,7 @@
           <a:p>
             <a:fld id="{56B6BD69-149A-CD41-9E7C-E241C9398BA0}" type="datetimeFigureOut">
               <a:rPr lang="en-US" smtClean="0"/>
-              <a:t>3/12/2017</a:t>
+              <a:t>3/16/17</a:t>
             </a:fld>
             <a:endParaRPr lang="en-US"/>
           </a:p>
@@ -1977,7 +1977,7 @@
           <a:p>
             <a:fld id="{56B6BD69-149A-CD41-9E7C-E241C9398BA0}" type="datetimeFigureOut">
               <a:rPr lang="en-US" smtClean="0"/>
-              <a:t>3/12/2017</a:t>
+              <a:t>3/16/17</a:t>
             </a:fld>
             <a:endParaRPr lang="en-US"/>
           </a:p>
@@ -2262,7 +2262,7 @@
           <a:p>
             <a:fld id="{56B6BD69-149A-CD41-9E7C-E241C9398BA0}" type="datetimeFigureOut">
               <a:rPr lang="en-US" smtClean="0"/>
-              <a:t>3/12/2017</a:t>
+              <a:t>3/16/17</a:t>
             </a:fld>
             <a:endParaRPr lang="en-US"/>
           </a:p>
@@ -2686,7 +2686,7 @@
           <a:p>
             <a:fld id="{56B6BD69-149A-CD41-9E7C-E241C9398BA0}" type="datetimeFigureOut">
               <a:rPr lang="en-US" smtClean="0"/>
-              <a:t>3/12/2017</a:t>
+              <a:t>3/16/17</a:t>
             </a:fld>
             <a:endParaRPr lang="en-US"/>
           </a:p>
@@ -2803,7 +2803,7 @@
           <a:p>
             <a:fld id="{56B6BD69-149A-CD41-9E7C-E241C9398BA0}" type="datetimeFigureOut">
               <a:rPr lang="en-US" smtClean="0"/>
-              <a:t>3/12/2017</a:t>
+              <a:t>3/16/17</a:t>
             </a:fld>
             <a:endParaRPr lang="en-US"/>
           </a:p>
@@ -2898,7 +2898,7 @@
           <a:p>
             <a:fld id="{56B6BD69-149A-CD41-9E7C-E241C9398BA0}" type="datetimeFigureOut">
               <a:rPr lang="en-US" smtClean="0"/>
-              <a:t>3/12/2017</a:t>
+              <a:t>3/16/17</a:t>
             </a:fld>
             <a:endParaRPr lang="en-US"/>
           </a:p>
@@ -3173,7 +3173,7 @@
           <a:p>
             <a:fld id="{56B6BD69-149A-CD41-9E7C-E241C9398BA0}" type="datetimeFigureOut">
               <a:rPr lang="en-US" smtClean="0"/>
-              <a:t>3/12/2017</a:t>
+              <a:t>3/16/17</a:t>
             </a:fld>
             <a:endParaRPr lang="en-US"/>
           </a:p>
@@ -3428,7 +3428,7 @@
           <a:p>
             <a:fld id="{56B6BD69-149A-CD41-9E7C-E241C9398BA0}" type="datetimeFigureOut">
               <a:rPr lang="en-US" smtClean="0"/>
-              <a:t>3/12/2017</a:t>
+              <a:t>3/16/17</a:t>
             </a:fld>
             <a:endParaRPr lang="en-US"/>
           </a:p>
@@ -3640,7 +3640,7 @@
           <a:p>
             <a:fld id="{56B6BD69-149A-CD41-9E7C-E241C9398BA0}" type="datetimeFigureOut">
               <a:rPr lang="en-US" smtClean="0"/>
-              <a:t>3/12/2017</a:t>
+              <a:t>3/16/17</a:t>
             </a:fld>
             <a:endParaRPr lang="en-US"/>
           </a:p>
@@ -4137,8 +4137,8 @@
         </p:nvSpPr>
         <p:spPr>
           <a:xfrm>
-            <a:off x="12469125" y="12039600"/>
-            <a:ext cx="9222475" cy="18962798"/>
+            <a:off x="12469125" y="12039599"/>
+            <a:ext cx="9222475" cy="20312743"/>
           </a:xfrm>
           <a:prstGeom prst="rect">
             <a:avLst/>
@@ -4816,204 +4816,12 @@
               <a:t> non </a:t>
             </a:r>
             <a:r>
-              <a:rPr lang="en-US" sz="3000" dirty="0" err="1"/>
+              <a:rPr lang="en-US" sz="3000" dirty="0" err="1" smtClean="0"/>
               <a:t>urna</a:t>
             </a:r>
             <a:r>
-              <a:rPr lang="en-US" sz="3000" dirty="0"/>
-              <a:t> </a:t>
-            </a:r>
-            <a:r>
-              <a:rPr lang="en-US" sz="3000" dirty="0" err="1"/>
-              <a:t>leo</a:t>
-            </a:r>
-            <a:r>
-              <a:rPr lang="en-US" sz="3000" dirty="0"/>
-              <a:t>, </a:t>
-            </a:r>
-            <a:r>
-              <a:rPr lang="en-US" sz="3000" dirty="0" err="1"/>
-              <a:t>vel</a:t>
-            </a:r>
-            <a:r>
-              <a:rPr lang="en-US" sz="3000" dirty="0"/>
-              <a:t> </a:t>
-            </a:r>
-            <a:r>
-              <a:rPr lang="en-US" sz="3000" dirty="0" err="1"/>
-              <a:t>cursus</a:t>
-            </a:r>
-            <a:r>
-              <a:rPr lang="en-US" sz="3000" dirty="0"/>
-              <a:t> </a:t>
-            </a:r>
-            <a:r>
-              <a:rPr lang="en-US" sz="3000" dirty="0" err="1"/>
-              <a:t>nulla</a:t>
-            </a:r>
-            <a:r>
-              <a:rPr lang="en-US" sz="3000" dirty="0"/>
-              <a:t>. </a:t>
-            </a:r>
-            <a:r>
-              <a:rPr lang="en-US" sz="3000" dirty="0" err="1"/>
-              <a:t>Nullam</a:t>
-            </a:r>
-            <a:r>
-              <a:rPr lang="en-US" sz="3000" dirty="0"/>
-              <a:t> </a:t>
-            </a:r>
-            <a:r>
-              <a:rPr lang="en-US" sz="3000" dirty="0" err="1"/>
-              <a:t>tristique</a:t>
-            </a:r>
-            <a:r>
-              <a:rPr lang="en-US" sz="3000" dirty="0"/>
-              <a:t> </a:t>
-            </a:r>
-            <a:r>
-              <a:rPr lang="en-US" sz="3000" dirty="0" err="1"/>
-              <a:t>laoreet</a:t>
-            </a:r>
-            <a:r>
-              <a:rPr lang="en-US" sz="3000" dirty="0"/>
-              <a:t> </a:t>
-            </a:r>
-            <a:r>
-              <a:rPr lang="en-US" sz="3000" dirty="0" err="1"/>
-              <a:t>diam</a:t>
-            </a:r>
-            <a:r>
-              <a:rPr lang="en-US" sz="3000" dirty="0"/>
-              <a:t> a </a:t>
-            </a:r>
-            <a:r>
-              <a:rPr lang="en-US" sz="3000" dirty="0" err="1"/>
-              <a:t>consequat</a:t>
-            </a:r>
-            <a:r>
-              <a:rPr lang="en-US" sz="3000" dirty="0"/>
-              <a:t>. </a:t>
-            </a:r>
-            <a:r>
-              <a:rPr lang="en-US" sz="3000" dirty="0" err="1"/>
-              <a:t>Sed</a:t>
-            </a:r>
-            <a:r>
-              <a:rPr lang="en-US" sz="3000" dirty="0"/>
-              <a:t> </a:t>
-            </a:r>
-            <a:r>
-              <a:rPr lang="en-US" sz="3000" dirty="0" err="1"/>
-              <a:t>condimentum</a:t>
-            </a:r>
-            <a:r>
-              <a:rPr lang="en-US" sz="3000" dirty="0"/>
-              <a:t> </a:t>
-            </a:r>
-            <a:r>
-              <a:rPr lang="en-US" sz="3000" dirty="0" err="1"/>
-              <a:t>convallis</a:t>
-            </a:r>
-            <a:r>
-              <a:rPr lang="en-US" sz="3000" dirty="0"/>
-              <a:t> </a:t>
-            </a:r>
-            <a:r>
-              <a:rPr lang="en-US" sz="3000" dirty="0" err="1"/>
-              <a:t>orci</a:t>
-            </a:r>
-            <a:r>
-              <a:rPr lang="en-US" sz="3000" dirty="0"/>
-              <a:t>, </a:t>
-            </a:r>
-            <a:r>
-              <a:rPr lang="en-US" sz="3000" dirty="0" err="1"/>
-              <a:t>eu</a:t>
-            </a:r>
-            <a:r>
-              <a:rPr lang="en-US" sz="3000" dirty="0"/>
-              <a:t> </a:t>
-            </a:r>
-            <a:r>
-              <a:rPr lang="en-US" sz="3000" dirty="0" err="1"/>
-              <a:t>dignissim</a:t>
-            </a:r>
-            <a:r>
-              <a:rPr lang="en-US" sz="3000" dirty="0"/>
-              <a:t> ante </a:t>
-            </a:r>
-            <a:r>
-              <a:rPr lang="en-US" sz="3000" dirty="0" err="1"/>
-              <a:t>elementum</a:t>
-            </a:r>
-            <a:r>
-              <a:rPr lang="en-US" sz="3000" dirty="0"/>
-              <a:t> ac. </a:t>
-            </a:r>
-            <a:r>
-              <a:rPr lang="en-US" sz="3000" dirty="0" err="1"/>
-              <a:t>Donec</a:t>
-            </a:r>
-            <a:r>
-              <a:rPr lang="en-US" sz="3000" dirty="0"/>
-              <a:t> quam </a:t>
-            </a:r>
-            <a:r>
-              <a:rPr lang="en-US" sz="3000" dirty="0" err="1"/>
-              <a:t>tellus</a:t>
-            </a:r>
-            <a:r>
-              <a:rPr lang="en-US" sz="3000" dirty="0"/>
-              <a:t>, </a:t>
-            </a:r>
-            <a:r>
-              <a:rPr lang="en-US" sz="3000" dirty="0" err="1"/>
-              <a:t>fringilla</a:t>
-            </a:r>
-            <a:r>
-              <a:rPr lang="en-US" sz="3000" dirty="0"/>
-              <a:t> </a:t>
-            </a:r>
-            <a:r>
-              <a:rPr lang="en-US" sz="3000" dirty="0" err="1"/>
-              <a:t>vel</a:t>
-            </a:r>
-            <a:r>
-              <a:rPr lang="en-US" sz="3000" dirty="0"/>
-              <a:t> </a:t>
-            </a:r>
-            <a:r>
-              <a:rPr lang="en-US" sz="3000" dirty="0" err="1"/>
-              <a:t>gravida</a:t>
-            </a:r>
-            <a:r>
-              <a:rPr lang="en-US" sz="3000" dirty="0"/>
-              <a:t> sit </a:t>
-            </a:r>
-            <a:r>
-              <a:rPr lang="en-US" sz="3000" dirty="0" err="1"/>
-              <a:t>amet</a:t>
-            </a:r>
-            <a:r>
-              <a:rPr lang="en-US" sz="3000" dirty="0"/>
-              <a:t>, </a:t>
-            </a:r>
-            <a:r>
-              <a:rPr lang="en-US" sz="3000" dirty="0" err="1"/>
-              <a:t>egestas</a:t>
-            </a:r>
-            <a:r>
-              <a:rPr lang="en-US" sz="3000" dirty="0"/>
-              <a:t> id </a:t>
-            </a:r>
-            <a:r>
-              <a:rPr lang="en-US" sz="3000" dirty="0" err="1"/>
-              <a:t>nulla</a:t>
-            </a:r>
-            <a:r>
-              <a:rPr lang="en-US" sz="3000" dirty="0"/>
-              <a:t>. </a:t>
+              <a:rPr lang="en-US" sz="3000" dirty="0" smtClean="0"/>
+              <a:t>.</a:t>
             </a:r>
           </a:p>
           <a:p>
@@ -5022,366 +4830,11 @@
                 <a:spcPts val="1800"/>
               </a:spcAft>
             </a:pPr>
-            <a:r>
-              <a:rPr lang="en-US" sz="3000" dirty="0" err="1"/>
-              <a:t>Proin</a:t>
-            </a:r>
-            <a:r>
-              <a:rPr lang="en-US" sz="3000" dirty="0"/>
-              <a:t> </a:t>
-            </a:r>
-            <a:r>
-              <a:rPr lang="en-US" sz="3000" dirty="0" err="1"/>
-              <a:t>eget</a:t>
-            </a:r>
-            <a:r>
-              <a:rPr lang="en-US" sz="3000" dirty="0"/>
-              <a:t> </a:t>
-            </a:r>
-            <a:r>
-              <a:rPr lang="en-US" sz="3000" dirty="0" err="1"/>
-              <a:t>velit</a:t>
-            </a:r>
-            <a:r>
-              <a:rPr lang="en-US" sz="3000" dirty="0"/>
-              <a:t> </a:t>
-            </a:r>
-            <a:r>
-              <a:rPr lang="en-US" sz="3000" dirty="0" err="1"/>
-              <a:t>nisl</a:t>
-            </a:r>
-            <a:r>
-              <a:rPr lang="en-US" sz="3000" dirty="0"/>
-              <a:t>. </a:t>
-            </a:r>
-            <a:r>
-              <a:rPr lang="en-US" sz="3000" dirty="0" err="1"/>
-              <a:t>Morbi</a:t>
-            </a:r>
-            <a:r>
-              <a:rPr lang="en-US" sz="3000" dirty="0"/>
-              <a:t> </a:t>
-            </a:r>
-            <a:r>
-              <a:rPr lang="en-US" sz="3000" dirty="0" err="1"/>
-              <a:t>lacinia</a:t>
-            </a:r>
-            <a:r>
-              <a:rPr lang="en-US" sz="3000" dirty="0"/>
-              <a:t> </a:t>
-            </a:r>
-            <a:r>
-              <a:rPr lang="en-US" sz="3000" dirty="0" err="1"/>
-              <a:t>volutPellentesque</a:t>
-            </a:r>
-            <a:r>
-              <a:rPr lang="en-US" sz="3000" dirty="0"/>
-              <a:t> semper </a:t>
-            </a:r>
-            <a:r>
-              <a:rPr lang="en-US" sz="3000" dirty="0" err="1"/>
-              <a:t>vehicula</a:t>
-            </a:r>
-            <a:r>
-              <a:rPr lang="en-US" sz="3000" dirty="0"/>
-              <a:t> </a:t>
-            </a:r>
-            <a:r>
-              <a:rPr lang="en-US" sz="3000" dirty="0" err="1"/>
-              <a:t>turpis</a:t>
-            </a:r>
-            <a:r>
-              <a:rPr lang="en-US" sz="3000" dirty="0"/>
-              <a:t> </a:t>
-            </a:r>
-            <a:r>
-              <a:rPr lang="en-US" sz="3000" dirty="0" err="1"/>
-              <a:t>facilisis</a:t>
-            </a:r>
-            <a:r>
-              <a:rPr lang="en-US" sz="3000" dirty="0"/>
-              <a:t> </a:t>
-            </a:r>
-            <a:r>
-              <a:rPr lang="en-US" sz="3000" dirty="0" err="1"/>
-              <a:t>interdum</a:t>
-            </a:r>
-            <a:r>
-              <a:rPr lang="en-US" sz="3000" dirty="0"/>
-              <a:t>. </a:t>
-            </a:r>
-            <a:r>
-              <a:rPr lang="en-US" sz="3000" dirty="0" err="1"/>
-              <a:t>Aliquam</a:t>
-            </a:r>
-            <a:r>
-              <a:rPr lang="en-US" sz="3000" dirty="0"/>
-              <a:t> </a:t>
-            </a:r>
-            <a:r>
-              <a:rPr lang="en-US" sz="3000" dirty="0" err="1"/>
-              <a:t>sodales</a:t>
-            </a:r>
-            <a:r>
-              <a:rPr lang="en-US" sz="3000" dirty="0"/>
-              <a:t> </a:t>
-            </a:r>
-            <a:r>
-              <a:rPr lang="en-US" sz="3000" dirty="0" err="1"/>
-              <a:t>purus</a:t>
-            </a:r>
-            <a:r>
-              <a:rPr lang="en-US" sz="3000" dirty="0"/>
-              <a:t> a ligula </a:t>
-            </a:r>
-            <a:r>
-              <a:rPr lang="en-US" sz="3000" dirty="0" err="1"/>
-              <a:t>venenatis</a:t>
-            </a:r>
-            <a:r>
-              <a:rPr lang="en-US" sz="3000" dirty="0"/>
-              <a:t> id </a:t>
-            </a:r>
-            <a:r>
-              <a:rPr lang="en-US" sz="3000" dirty="0" err="1"/>
-              <a:t>imperdiet</a:t>
-            </a:r>
-            <a:r>
-              <a:rPr lang="en-US" sz="3000" dirty="0"/>
-              <a:t> </a:t>
-            </a:r>
-            <a:r>
-              <a:rPr lang="en-US" sz="3000" dirty="0" err="1"/>
-              <a:t>sem</a:t>
-            </a:r>
-            <a:r>
-              <a:rPr lang="en-US" sz="3000" dirty="0"/>
-              <a:t> </a:t>
-            </a:r>
-            <a:r>
-              <a:rPr lang="en-US" sz="3000" dirty="0" err="1"/>
-              <a:t>posuere</a:t>
-            </a:r>
-            <a:r>
-              <a:rPr lang="en-US" sz="3000" dirty="0"/>
-              <a:t>. </a:t>
-            </a:r>
-            <a:r>
-              <a:rPr lang="en-US" sz="3000" dirty="0" err="1"/>
-              <a:t>Proin</a:t>
-            </a:r>
-            <a:r>
-              <a:rPr lang="en-US" sz="3000" dirty="0"/>
-              <a:t> in </a:t>
-            </a:r>
-            <a:r>
-              <a:rPr lang="en-US" sz="3000" dirty="0" err="1"/>
-              <a:t>imperdiet</a:t>
-            </a:r>
-            <a:r>
-              <a:rPr lang="en-US" sz="3000" dirty="0"/>
-              <a:t> </a:t>
-            </a:r>
-            <a:r>
-              <a:rPr lang="en-US" sz="3000" dirty="0" err="1"/>
-              <a:t>neque</a:t>
-            </a:r>
-            <a:r>
-              <a:rPr lang="en-US" sz="3000" dirty="0"/>
-              <a:t>. </a:t>
-            </a:r>
-            <a:r>
-              <a:rPr lang="en-US" sz="3000" dirty="0" err="1"/>
-              <a:t>Pellentesque</a:t>
-            </a:r>
-            <a:r>
-              <a:rPr lang="en-US" sz="3000" dirty="0"/>
-              <a:t> </a:t>
-            </a:r>
-            <a:r>
-              <a:rPr lang="en-US" sz="3000" dirty="0" err="1"/>
-              <a:t>nec</a:t>
-            </a:r>
-            <a:r>
-              <a:rPr lang="en-US" sz="3000" dirty="0"/>
-              <a:t> </a:t>
-            </a:r>
-            <a:r>
-              <a:rPr lang="en-US" sz="3000" dirty="0" err="1"/>
-              <a:t>malesuada</a:t>
-            </a:r>
-            <a:r>
-              <a:rPr lang="en-US" sz="3000" dirty="0"/>
-              <a:t> </a:t>
-            </a:r>
-            <a:r>
-              <a:rPr lang="en-US" sz="3000" dirty="0" err="1"/>
-              <a:t>erat</a:t>
-            </a:r>
-            <a:r>
-              <a:rPr lang="en-US" sz="3000" dirty="0"/>
-              <a:t>. </a:t>
-            </a:r>
-            <a:r>
-              <a:rPr lang="en-US" sz="3000" dirty="0" err="1"/>
-              <a:t>Praesent</a:t>
-            </a:r>
-            <a:r>
-              <a:rPr lang="en-US" sz="3000" dirty="0"/>
-              <a:t> </a:t>
-            </a:r>
-            <a:r>
-              <a:rPr lang="en-US" sz="3000" dirty="0" err="1"/>
-              <a:t>aliquam</a:t>
-            </a:r>
-            <a:r>
-              <a:rPr lang="en-US" sz="3000" dirty="0"/>
-              <a:t>, </a:t>
-            </a:r>
-            <a:r>
-              <a:rPr lang="en-US" sz="3000" dirty="0" err="1"/>
-              <a:t>augue</a:t>
-            </a:r>
-            <a:r>
-              <a:rPr lang="en-US" sz="3000" dirty="0"/>
-              <a:t> non </a:t>
-            </a:r>
-            <a:r>
-              <a:rPr lang="en-US" sz="3000" dirty="0" err="1"/>
-              <a:t>pharetra</a:t>
-            </a:r>
-            <a:r>
-              <a:rPr lang="en-US" sz="3000" dirty="0"/>
-              <a:t> </a:t>
-            </a:r>
-            <a:r>
-              <a:rPr lang="en-US" sz="3000" dirty="0" err="1"/>
-              <a:t>laoreet</a:t>
-            </a:r>
-            <a:r>
-              <a:rPr lang="en-US" sz="3000" dirty="0"/>
-              <a:t>, </a:t>
-            </a:r>
-            <a:r>
-              <a:rPr lang="en-US" sz="3000" dirty="0" err="1"/>
-              <a:t>ipsum</a:t>
-            </a:r>
-            <a:r>
-              <a:rPr lang="en-US" sz="3000" dirty="0"/>
-              <a:t> </a:t>
-            </a:r>
-            <a:r>
-              <a:rPr lang="en-US" sz="3000" dirty="0" err="1"/>
-              <a:t>sem</a:t>
-            </a:r>
-            <a:r>
-              <a:rPr lang="en-US" sz="3000" dirty="0"/>
-              <a:t> </a:t>
-            </a:r>
-            <a:r>
-              <a:rPr lang="en-US" sz="3000" dirty="0" err="1"/>
-              <a:t>vulputate</a:t>
-            </a:r>
-            <a:r>
-              <a:rPr lang="en-US" sz="3000" dirty="0"/>
-              <a:t> dolor, in </a:t>
-            </a:r>
-            <a:r>
-              <a:rPr lang="en-US" sz="3000" dirty="0" err="1"/>
-              <a:t>pulvinar</a:t>
-            </a:r>
-            <a:r>
-              <a:rPr lang="en-US" sz="3000" dirty="0"/>
-              <a:t> </a:t>
-            </a:r>
-            <a:r>
-              <a:rPr lang="en-US" sz="3000" dirty="0" err="1"/>
-              <a:t>tortor</a:t>
-            </a:r>
-            <a:r>
-              <a:rPr lang="en-US" sz="3000" dirty="0"/>
-              <a:t> mi at </a:t>
-            </a:r>
-            <a:r>
-              <a:rPr lang="en-US" sz="3000" dirty="0" err="1"/>
-              <a:t>purus</a:t>
-            </a:r>
-            <a:r>
-              <a:rPr lang="en-US" sz="3000" dirty="0"/>
-              <a:t>. </a:t>
-            </a:r>
-            <a:r>
-              <a:rPr lang="en-US" sz="3000" dirty="0" err="1"/>
-              <a:t>Nulla</a:t>
-            </a:r>
-            <a:r>
-              <a:rPr lang="en-US" sz="3000" dirty="0"/>
-              <a:t> </a:t>
-            </a:r>
-            <a:r>
-              <a:rPr lang="en-US" sz="3000" dirty="0" err="1"/>
-              <a:t>facilisi</a:t>
-            </a:r>
-            <a:r>
-              <a:rPr lang="en-US" sz="3000" dirty="0"/>
-              <a:t>. </a:t>
-            </a:r>
-            <a:r>
-              <a:rPr lang="en-US" sz="3000" dirty="0" err="1"/>
-              <a:t>Nunc</a:t>
-            </a:r>
-            <a:r>
-              <a:rPr lang="en-US" sz="3000" dirty="0"/>
-              <a:t> ac </a:t>
-            </a:r>
-            <a:r>
-              <a:rPr lang="en-US" sz="3000" dirty="0" err="1"/>
-              <a:t>odio</a:t>
-            </a:r>
-            <a:r>
-              <a:rPr lang="en-US" sz="3000" dirty="0"/>
-              <a:t> in </a:t>
-            </a:r>
-            <a:r>
-              <a:rPr lang="en-US" sz="3000" dirty="0" err="1"/>
-              <a:t>risus</a:t>
-            </a:r>
-            <a:r>
-              <a:rPr lang="en-US" sz="3000" dirty="0"/>
-              <a:t> </a:t>
-            </a:r>
-            <a:r>
-              <a:rPr lang="en-US" sz="3000" dirty="0" err="1"/>
-              <a:t>tristique</a:t>
-            </a:r>
-            <a:r>
-              <a:rPr lang="en-US" sz="3000" dirty="0"/>
-              <a:t> </a:t>
-            </a:r>
-            <a:r>
-              <a:rPr lang="en-US" sz="3000" dirty="0" err="1"/>
-              <a:t>commodo</a:t>
-            </a:r>
-            <a:r>
-              <a:rPr lang="en-US" sz="3000" dirty="0"/>
-              <a:t> a </a:t>
-            </a:r>
-            <a:r>
-              <a:rPr lang="en-US" sz="3000" dirty="0" err="1"/>
-              <a:t>eget</a:t>
-            </a:r>
-            <a:r>
-              <a:rPr lang="en-US" sz="3000" dirty="0"/>
-              <a:t> </a:t>
-            </a:r>
-            <a:r>
-              <a:rPr lang="en-US" sz="3000" dirty="0" err="1"/>
-              <a:t>massa</a:t>
-            </a:r>
-            <a:r>
-              <a:rPr lang="en-US" sz="3000" dirty="0"/>
-              <a:t>. </a:t>
-            </a:r>
+            <a:endParaRPr lang="en-US" sz="3000" b="1" dirty="0">
+              <a:solidFill>
+                <a:srgbClr val="5D87A1"/>
+              </a:solidFill>
+            </a:endParaRPr>
           </a:p>
           <a:p>
             <a:pPr>
@@ -5390,12 +4843,20 @@
               </a:spcAft>
             </a:pPr>
             <a:r>
+              <a:rPr lang="en-US" sz="3600" b="1" dirty="0" smtClean="0">
+                <a:solidFill>
+                  <a:srgbClr val="5D87A1"/>
+                </a:solidFill>
+              </a:rPr>
+              <a:t>TESTING </a:t>
+            </a:r>
+            <a:r>
               <a:rPr lang="en-US" sz="3600" b="1" dirty="0">
                 <a:solidFill>
                   <a:srgbClr val="5D87A1"/>
                 </a:solidFill>
               </a:rPr>
-              <a:t>TESTING METHODS</a:t>
+              <a:t>METHODS</a:t>
             </a:r>
           </a:p>
           <a:p>
@@ -5405,517 +4866,118 @@
               </a:spcAft>
             </a:pPr>
             <a:r>
-              <a:rPr lang="en-US" sz="3000" dirty="0" err="1"/>
-              <a:t>Urna</a:t>
-            </a:r>
-            <a:r>
-              <a:rPr lang="en-US" sz="3000" dirty="0"/>
-              <a:t> </a:t>
-            </a:r>
-            <a:r>
-              <a:rPr lang="en-US" sz="3000" dirty="0" err="1"/>
-              <a:t>aliquet</a:t>
-            </a:r>
-            <a:r>
-              <a:rPr lang="en-US" sz="3000" dirty="0"/>
-              <a:t> </a:t>
-            </a:r>
-            <a:r>
-              <a:rPr lang="en-US" sz="3000" dirty="0" err="1"/>
-              <a:t>mattis</a:t>
-            </a:r>
-            <a:r>
-              <a:rPr lang="en-US" sz="3000" dirty="0"/>
-              <a:t>. </a:t>
-            </a:r>
-            <a:r>
-              <a:rPr lang="en-US" sz="3000" dirty="0" err="1"/>
-              <a:t>Nunc</a:t>
-            </a:r>
-            <a:r>
-              <a:rPr lang="en-US" sz="3000" dirty="0"/>
-              <a:t> </a:t>
-            </a:r>
-            <a:r>
-              <a:rPr lang="en-US" sz="3000" dirty="0" err="1"/>
-              <a:t>quis</a:t>
-            </a:r>
-            <a:r>
-              <a:rPr lang="en-US" sz="3000" dirty="0"/>
-              <a:t> </a:t>
-            </a:r>
-            <a:r>
-              <a:rPr lang="en-US" sz="3000" dirty="0" err="1"/>
-              <a:t>enim</a:t>
-            </a:r>
-            <a:r>
-              <a:rPr lang="en-US" sz="3000" dirty="0"/>
-              <a:t> </a:t>
-            </a:r>
-            <a:r>
-              <a:rPr lang="en-US" sz="3000" dirty="0" err="1"/>
-              <a:t>lorem</a:t>
-            </a:r>
-            <a:r>
-              <a:rPr lang="en-US" sz="3000" dirty="0"/>
-              <a:t>, </a:t>
-            </a:r>
-            <a:r>
-              <a:rPr lang="en-US" sz="3000" dirty="0" err="1"/>
-              <a:t>aliquam</a:t>
-            </a:r>
-            <a:r>
-              <a:rPr lang="en-US" sz="3000" dirty="0"/>
-              <a:t> </a:t>
-            </a:r>
-            <a:r>
-              <a:rPr lang="en-US" sz="3000" dirty="0" err="1"/>
-              <a:t>consectetur</a:t>
-            </a:r>
-            <a:r>
-              <a:rPr lang="en-US" sz="3000" dirty="0"/>
-              <a:t> </a:t>
-            </a:r>
-            <a:r>
-              <a:rPr lang="en-US" sz="3000" dirty="0" err="1"/>
-              <a:t>justo</a:t>
-            </a:r>
-            <a:r>
-              <a:rPr lang="en-US" sz="3000" dirty="0"/>
-              <a:t>. </a:t>
-            </a:r>
-            <a:r>
-              <a:rPr lang="en-US" sz="3000" dirty="0" err="1"/>
-              <a:t>Ut</a:t>
-            </a:r>
-            <a:r>
-              <a:rPr lang="en-US" sz="3000" dirty="0"/>
-              <a:t> </a:t>
-            </a:r>
-            <a:r>
-              <a:rPr lang="en-US" sz="3000" dirty="0" err="1"/>
-              <a:t>interdum</a:t>
-            </a:r>
-            <a:r>
-              <a:rPr lang="en-US" sz="3000" dirty="0"/>
-              <a:t> </a:t>
-            </a:r>
-            <a:r>
-              <a:rPr lang="en-US" sz="3000" dirty="0" err="1"/>
-              <a:t>facilisis</a:t>
-            </a:r>
-            <a:r>
-              <a:rPr lang="en-US" sz="3000" dirty="0"/>
-              <a:t> ante </a:t>
-            </a:r>
-            <a:r>
-              <a:rPr lang="en-US" sz="3000" dirty="0" err="1"/>
-              <a:t>luctus</a:t>
-            </a:r>
-            <a:r>
-              <a:rPr lang="en-US" sz="3000" dirty="0"/>
-              <a:t> </a:t>
-            </a:r>
-            <a:r>
-              <a:rPr lang="en-US" sz="3000" dirty="0" err="1"/>
-              <a:t>tincidunt</a:t>
-            </a:r>
-            <a:r>
-              <a:rPr lang="en-US" sz="3000" dirty="0"/>
-              <a:t>. </a:t>
-            </a:r>
-            <a:r>
-              <a:rPr lang="en-US" sz="3000" dirty="0" err="1"/>
-              <a:t>Aenean</a:t>
-            </a:r>
-            <a:r>
-              <a:rPr lang="en-US" sz="3000" dirty="0"/>
-              <a:t> vitae </a:t>
-            </a:r>
-            <a:r>
-              <a:rPr lang="en-US" sz="3000" dirty="0" err="1"/>
-              <a:t>sapien</a:t>
-            </a:r>
-            <a:r>
-              <a:rPr lang="en-US" sz="3000" dirty="0"/>
-              <a:t> </a:t>
-            </a:r>
-            <a:r>
-              <a:rPr lang="en-US" sz="3000" dirty="0" err="1"/>
-              <a:t>nulla</a:t>
-            </a:r>
-            <a:r>
-              <a:rPr lang="en-US" sz="3000" dirty="0"/>
-              <a:t>, </a:t>
-            </a:r>
-            <a:r>
-              <a:rPr lang="en-US" sz="3000" dirty="0" err="1"/>
-              <a:t>sed</a:t>
-            </a:r>
-            <a:r>
-              <a:rPr lang="en-US" sz="3000" dirty="0"/>
-              <a:t> dictum dui. </a:t>
-            </a:r>
-            <a:r>
-              <a:rPr lang="en-US" sz="3000" dirty="0" err="1"/>
-              <a:t>Morbi</a:t>
-            </a:r>
-            <a:r>
-              <a:rPr lang="en-US" sz="3000" dirty="0"/>
-              <a:t> </a:t>
-            </a:r>
-            <a:r>
-              <a:rPr lang="en-US" sz="3000" dirty="0" err="1"/>
-              <a:t>diam</a:t>
-            </a:r>
-            <a:r>
-              <a:rPr lang="en-US" sz="3000" dirty="0"/>
-              <a:t> </a:t>
-            </a:r>
-            <a:r>
-              <a:rPr lang="en-US" sz="3000" dirty="0" err="1"/>
-              <a:t>lectus</a:t>
-            </a:r>
-            <a:r>
-              <a:rPr lang="en-US" sz="3000" dirty="0"/>
-              <a:t>, </a:t>
-            </a:r>
-            <a:r>
-              <a:rPr lang="en-US" sz="3000" dirty="0" err="1"/>
-              <a:t>porta</a:t>
-            </a:r>
-            <a:r>
-              <a:rPr lang="en-US" sz="3000" dirty="0"/>
-              <a:t> id </a:t>
-            </a:r>
-            <a:r>
-              <a:rPr lang="en-US" sz="3000" dirty="0" err="1"/>
-              <a:t>malesuada</a:t>
-            </a:r>
-            <a:r>
-              <a:rPr lang="en-US" sz="3000" dirty="0"/>
-              <a:t> </a:t>
-            </a:r>
-            <a:r>
-              <a:rPr lang="en-US" sz="3000" dirty="0" err="1"/>
-              <a:t>eu</a:t>
-            </a:r>
-            <a:r>
-              <a:rPr lang="en-US" sz="3000" dirty="0"/>
-              <a:t>, </a:t>
-            </a:r>
-            <a:r>
-              <a:rPr lang="en-US" sz="3000" dirty="0" err="1"/>
-              <a:t>consequat</a:t>
-            </a:r>
-            <a:r>
-              <a:rPr lang="en-US" sz="3000" dirty="0"/>
-              <a:t> a ante. </a:t>
-            </a:r>
-            <a:r>
-              <a:rPr lang="en-US" sz="3000" dirty="0" err="1"/>
-              <a:t>Nullam</a:t>
-            </a:r>
-            <a:r>
-              <a:rPr lang="en-US" sz="3000" dirty="0"/>
-              <a:t> vitae </a:t>
-            </a:r>
-            <a:r>
-              <a:rPr lang="en-US" sz="3000" dirty="0" err="1"/>
-              <a:t>varius</a:t>
-            </a:r>
-            <a:r>
-              <a:rPr lang="en-US" sz="3000" dirty="0"/>
-              <a:t> est. </a:t>
-            </a:r>
-            <a:r>
-              <a:rPr lang="en-US" sz="3000" dirty="0" err="1"/>
-              <a:t>Vivamus</a:t>
-            </a:r>
-            <a:r>
-              <a:rPr lang="en-US" sz="3000" dirty="0"/>
-              <a:t> ac </a:t>
-            </a:r>
-            <a:r>
-              <a:rPr lang="en-US" sz="3000" dirty="0" err="1"/>
-              <a:t>libero</a:t>
-            </a:r>
-            <a:r>
-              <a:rPr lang="en-US" sz="3000" dirty="0"/>
-              <a:t> </a:t>
-            </a:r>
-            <a:r>
-              <a:rPr lang="en-US" sz="3000" dirty="0" err="1"/>
-              <a:t>ut</a:t>
-            </a:r>
-            <a:r>
-              <a:rPr lang="en-US" sz="3000" dirty="0"/>
-              <a:t> </a:t>
-            </a:r>
-            <a:r>
-              <a:rPr lang="en-US" sz="3000" dirty="0" err="1"/>
-              <a:t>arcu</a:t>
-            </a:r>
-            <a:r>
-              <a:rPr lang="en-US" sz="3000" dirty="0"/>
-              <a:t> </a:t>
-            </a:r>
-            <a:r>
-              <a:rPr lang="en-US" sz="3000" dirty="0" err="1"/>
-              <a:t>accumsan</a:t>
-            </a:r>
-            <a:r>
-              <a:rPr lang="en-US" sz="3000" dirty="0"/>
-              <a:t> </a:t>
-            </a:r>
-            <a:r>
-              <a:rPr lang="en-US" sz="3000" dirty="0" err="1"/>
-              <a:t>convallis</a:t>
-            </a:r>
-            <a:r>
-              <a:rPr lang="en-US" sz="3000" dirty="0"/>
-              <a:t> vitae </a:t>
-            </a:r>
-            <a:r>
-              <a:rPr lang="en-US" sz="3000" dirty="0" err="1"/>
-              <a:t>vel</a:t>
-            </a:r>
-            <a:r>
-              <a:rPr lang="en-US" sz="3000" dirty="0"/>
-              <a:t> </a:t>
-            </a:r>
-            <a:r>
-              <a:rPr lang="en-US" sz="3000" dirty="0" err="1"/>
-              <a:t>leo</a:t>
-            </a:r>
-            <a:r>
-              <a:rPr lang="en-US" sz="3000" dirty="0"/>
-              <a:t>. </a:t>
-            </a:r>
-            <a:r>
-              <a:rPr lang="en-US" sz="3000" dirty="0" err="1"/>
-              <a:t>Curabitur</a:t>
-            </a:r>
-            <a:r>
-              <a:rPr lang="en-US" sz="3000" dirty="0"/>
-              <a:t> </a:t>
-            </a:r>
-            <a:r>
-              <a:rPr lang="en-US" sz="3000" dirty="0" err="1"/>
-              <a:t>molestie</a:t>
-            </a:r>
-            <a:r>
-              <a:rPr lang="en-US" sz="3000" dirty="0"/>
-              <a:t> </a:t>
-            </a:r>
-            <a:r>
-              <a:rPr lang="en-US" sz="3000" dirty="0" err="1"/>
-              <a:t>risus</a:t>
-            </a:r>
-            <a:r>
-              <a:rPr lang="en-US" sz="3000" dirty="0"/>
-              <a:t> non </a:t>
-            </a:r>
-            <a:r>
-              <a:rPr lang="en-US" sz="3000" dirty="0" err="1"/>
-              <a:t>turpis</a:t>
-            </a:r>
-            <a:r>
-              <a:rPr lang="en-US" sz="3000" dirty="0"/>
-              <a:t> </a:t>
-            </a:r>
-            <a:r>
-              <a:rPr lang="en-US" sz="3000" dirty="0" err="1"/>
-              <a:t>luctus</a:t>
-            </a:r>
-            <a:r>
-              <a:rPr lang="en-US" sz="3000" dirty="0"/>
-              <a:t> </a:t>
-            </a:r>
-            <a:r>
-              <a:rPr lang="en-US" sz="3000" dirty="0" err="1"/>
-              <a:t>aliquet</a:t>
-            </a:r>
-            <a:r>
-              <a:rPr lang="en-US" sz="3000" dirty="0"/>
-              <a:t>. </a:t>
-            </a:r>
-            <a:r>
-              <a:rPr lang="en-US" sz="3000" dirty="0" err="1"/>
-              <a:t>Aliquam</a:t>
-            </a:r>
-            <a:r>
-              <a:rPr lang="en-US" sz="3000" dirty="0"/>
-              <a:t> </a:t>
-            </a:r>
-            <a:r>
-              <a:rPr lang="en-US" sz="3000" dirty="0" err="1"/>
-              <a:t>erat</a:t>
-            </a:r>
-            <a:r>
-              <a:rPr lang="en-US" sz="3000" dirty="0"/>
-              <a:t> </a:t>
-            </a:r>
-            <a:r>
-              <a:rPr lang="en-US" sz="3000" dirty="0" err="1"/>
-              <a:t>volutpat</a:t>
-            </a:r>
-            <a:r>
-              <a:rPr lang="en-US" sz="3000" dirty="0"/>
-              <a:t>. </a:t>
-            </a:r>
-            <a:r>
-              <a:rPr lang="en-US" sz="3000" dirty="0" err="1"/>
-              <a:t>Pellentesque</a:t>
-            </a:r>
-            <a:r>
-              <a:rPr lang="en-US" sz="3000" dirty="0"/>
-              <a:t> </a:t>
-            </a:r>
-            <a:r>
-              <a:rPr lang="en-US" sz="3000" dirty="0" err="1"/>
-              <a:t>consectetur</a:t>
-            </a:r>
-            <a:r>
-              <a:rPr lang="en-US" sz="3000" dirty="0"/>
-              <a:t> </a:t>
-            </a:r>
-            <a:r>
-              <a:rPr lang="en-US" sz="3000" dirty="0" err="1"/>
-              <a:t>auctor</a:t>
-            </a:r>
-            <a:r>
-              <a:rPr lang="en-US" sz="3000" dirty="0"/>
-              <a:t> </a:t>
-            </a:r>
-            <a:r>
-              <a:rPr lang="en-US" sz="3000" dirty="0" err="1"/>
-              <a:t>sapien</a:t>
-            </a:r>
-            <a:r>
-              <a:rPr lang="en-US" sz="3000" dirty="0"/>
-              <a:t>, </a:t>
-            </a:r>
-            <a:r>
-              <a:rPr lang="en-US" sz="3000" dirty="0" err="1"/>
-              <a:t>quis</a:t>
-            </a:r>
-            <a:r>
-              <a:rPr lang="en-US" sz="3000" dirty="0"/>
-              <a:t> </a:t>
-            </a:r>
-            <a:r>
-              <a:rPr lang="en-US" sz="3000" dirty="0" err="1"/>
-              <a:t>aliquam</a:t>
-            </a:r>
-            <a:r>
-              <a:rPr lang="en-US" sz="3000" dirty="0"/>
-              <a:t> lacus </a:t>
-            </a:r>
-            <a:r>
-              <a:rPr lang="en-US" sz="3000" dirty="0" err="1"/>
-              <a:t>cursus</a:t>
-            </a:r>
-            <a:r>
-              <a:rPr lang="en-US" sz="3000" dirty="0"/>
-              <a:t> non. </a:t>
-            </a:r>
-            <a:r>
-              <a:rPr lang="en-US" sz="3000" dirty="0" err="1"/>
-              <a:t>Donec</a:t>
-            </a:r>
-            <a:r>
-              <a:rPr lang="en-US" sz="3000" dirty="0"/>
-              <a:t> </a:t>
-            </a:r>
-            <a:r>
-              <a:rPr lang="en-US" sz="3000" dirty="0" err="1"/>
-              <a:t>sollicitudin</a:t>
-            </a:r>
-            <a:r>
-              <a:rPr lang="en-US" sz="3000" dirty="0"/>
-              <a:t> </a:t>
-            </a:r>
-            <a:r>
-              <a:rPr lang="en-US" sz="3000" dirty="0" err="1"/>
-              <a:t>varius</a:t>
-            </a:r>
-            <a:r>
-              <a:rPr lang="en-US" sz="3000" dirty="0"/>
-              <a:t> </a:t>
-            </a:r>
-            <a:r>
-              <a:rPr lang="en-US" sz="3000" dirty="0" err="1"/>
-              <a:t>luctus</a:t>
-            </a:r>
-            <a:r>
-              <a:rPr lang="en-US" sz="3000" dirty="0"/>
-              <a:t>. </a:t>
-            </a:r>
-            <a:r>
-              <a:rPr lang="en-US" sz="3000" dirty="0" err="1"/>
-              <a:t>Quisque</a:t>
-            </a:r>
-            <a:r>
-              <a:rPr lang="en-US" sz="3000" dirty="0"/>
-              <a:t> </a:t>
-            </a:r>
-            <a:r>
-              <a:rPr lang="en-US" sz="3000" dirty="0" err="1"/>
-              <a:t>sagittis</a:t>
-            </a:r>
-            <a:r>
-              <a:rPr lang="en-US" sz="3000" dirty="0"/>
-              <a:t> </a:t>
-            </a:r>
-            <a:r>
-              <a:rPr lang="en-US" sz="3000" dirty="0" err="1"/>
-              <a:t>tristique</a:t>
-            </a:r>
-            <a:r>
-              <a:rPr lang="en-US" sz="3000" dirty="0"/>
-              <a:t> </a:t>
-            </a:r>
-            <a:r>
-              <a:rPr lang="en-US" sz="3000" dirty="0" err="1"/>
-              <a:t>arcu</a:t>
-            </a:r>
-            <a:r>
-              <a:rPr lang="en-US" sz="3000" dirty="0"/>
-              <a:t>, </a:t>
-            </a:r>
-            <a:r>
-              <a:rPr lang="en-US" sz="3000" dirty="0" err="1"/>
-              <a:t>sed</a:t>
-            </a:r>
-            <a:r>
-              <a:rPr lang="en-US" sz="3000" dirty="0"/>
-              <a:t> </a:t>
-            </a:r>
-            <a:r>
-              <a:rPr lang="en-US" sz="3000" dirty="0" err="1"/>
-              <a:t>vehicula</a:t>
-            </a:r>
-            <a:r>
-              <a:rPr lang="en-US" sz="3000" dirty="0"/>
-              <a:t> lacus </a:t>
-            </a:r>
-            <a:r>
-              <a:rPr lang="en-US" sz="3000" dirty="0" err="1"/>
-              <a:t>ultrices</a:t>
-            </a:r>
-            <a:r>
-              <a:rPr lang="en-US" sz="3000" dirty="0"/>
-              <a:t> </a:t>
-            </a:r>
-            <a:r>
-              <a:rPr lang="en-US" sz="3000" dirty="0" err="1"/>
-              <a:t>convallis</a:t>
-            </a:r>
-            <a:r>
-              <a:rPr lang="en-US" sz="3000" dirty="0"/>
-              <a:t>. </a:t>
-            </a:r>
+              <a:rPr lang="en-US" sz="3000" dirty="0"/>
+              <a:t>Capturing communication data between the user flying the drone, and the drone itself, will allow us to reverse </a:t>
+            </a:r>
+            <a:r>
+              <a:rPr lang="en-US" sz="3000" dirty="0" smtClean="0"/>
+              <a:t>engineer the </a:t>
+            </a:r>
+            <a:r>
+              <a:rPr lang="en-US" sz="3000" dirty="0"/>
+              <a:t>communication protocols being used. Being able to capture that data also presents the possibility of doing </a:t>
+            </a:r>
+            <a:r>
+              <a:rPr lang="en-US" sz="3000" dirty="0" smtClean="0"/>
+              <a:t>a Man-In-The-Middle </a:t>
+            </a:r>
+            <a:r>
+              <a:rPr lang="en-US" sz="3000" dirty="0"/>
+              <a:t>(MITM) like attack, enabling an attacker to intercept and spoof commands being sent to the </a:t>
+            </a:r>
+            <a:r>
+              <a:rPr lang="en-US" sz="3000" dirty="0" smtClean="0"/>
+              <a:t>drone in </a:t>
+            </a:r>
+            <a:r>
+              <a:rPr lang="en-US" sz="3000" dirty="0"/>
+              <a:t>real </a:t>
+            </a:r>
+            <a:r>
+              <a:rPr lang="en-US" sz="3000" dirty="0" smtClean="0"/>
+              <a:t>time. In </a:t>
+            </a:r>
+            <a:r>
+              <a:rPr lang="en-US" sz="3000" dirty="0"/>
+              <a:t>order to capture this data, we need hardware that can receive RF on the 2.4Ghz and 900Mhz band. There are many, </a:t>
+            </a:r>
+            <a:r>
+              <a:rPr lang="en-US" sz="3000" dirty="0" smtClean="0"/>
+              <a:t>many options </a:t>
+            </a:r>
+            <a:r>
+              <a:rPr lang="en-US" sz="3000" dirty="0"/>
+              <a:t>out there, some of which can be quite costly. Since the primary method of communication is through the 2.4 </a:t>
+            </a:r>
+            <a:r>
+              <a:rPr lang="en-US" sz="3000" dirty="0" err="1" smtClean="0"/>
+              <a:t>Ghz</a:t>
+            </a:r>
+            <a:r>
+              <a:rPr lang="en-US" sz="3000" dirty="0" smtClean="0"/>
+              <a:t> band</a:t>
+            </a:r>
+            <a:r>
+              <a:rPr lang="en-US" sz="3000" dirty="0"/>
+              <a:t>, we can use a standard wireless radio that can run in promiscuous </a:t>
+            </a:r>
+            <a:r>
+              <a:rPr lang="en-US" sz="3000" dirty="0" smtClean="0"/>
+              <a:t>mode. </a:t>
+            </a:r>
+            <a:r>
+              <a:rPr lang="en-US" sz="3000" dirty="0"/>
+              <a:t>Promiscuous Mode </a:t>
+            </a:r>
+            <a:r>
+              <a:rPr lang="en-US" sz="3000" dirty="0" smtClean="0"/>
+              <a:t>enables us </a:t>
+            </a:r>
+            <a:r>
+              <a:rPr lang="en-US" sz="3000" dirty="0"/>
+              <a:t>to capture wireless packets without associating with an access point. </a:t>
+            </a:r>
+            <a:r>
+              <a:rPr lang="en-US" sz="3000" dirty="0" smtClean="0"/>
+              <a:t>With </a:t>
+            </a:r>
+            <a:r>
+              <a:rPr lang="en-US" sz="3000" dirty="0"/>
+              <a:t>this, we can use the </a:t>
+            </a:r>
+            <a:r>
+              <a:rPr lang="en-US" sz="3000" dirty="0" err="1"/>
+              <a:t>Aircrack</a:t>
+            </a:r>
+            <a:r>
+              <a:rPr lang="en-US" sz="3000" dirty="0"/>
+              <a:t>-NG suite of wireless auditing tools to attack the </a:t>
+            </a:r>
+            <a:r>
+              <a:rPr lang="en-US" sz="3000" dirty="0" smtClean="0"/>
+              <a:t>wireless communication </a:t>
+            </a:r>
+            <a:r>
+              <a:rPr lang="en-US" sz="3000" dirty="0"/>
+              <a:t>channel that the drone </a:t>
+            </a:r>
+            <a:r>
+              <a:rPr lang="en-US" sz="3000" dirty="0" smtClean="0"/>
+              <a:t>uses. With </a:t>
+            </a:r>
+            <a:r>
+              <a:rPr lang="en-US" sz="3000" dirty="0"/>
+              <a:t>these tools we will be able to capture communication between the drone and the drone ground control station, </a:t>
+            </a:r>
+            <a:r>
+              <a:rPr lang="en-US" sz="3000" dirty="0" smtClean="0"/>
+              <a:t>allowing us </a:t>
+            </a:r>
+            <a:r>
+              <a:rPr lang="en-US" sz="3000" dirty="0"/>
+              <a:t>to leverage that data to develop drone attack methods, relating to our communications threat model.</a:t>
+            </a:r>
+            <a:endParaRPr lang="en-US" sz="3000" dirty="0"/>
           </a:p>
         </p:txBody>
       </p:sp>
@@ -7769,15 +6831,7 @@
             </a:r>
             <a:r>
               <a:rPr lang="en-US" sz="3000" dirty="0"/>
-              <a:t> </a:t>
-            </a:r>
-            <a:r>
-              <a:rPr lang="en-US" sz="3000" dirty="0" err="1"/>
-              <a:t>convallis</a:t>
-            </a:r>
-            <a:r>
-              <a:rPr lang="en-US" sz="3000" dirty="0"/>
-              <a:t> </a:t>
+              <a:t> convallis </a:t>
             </a:r>
             <a:r>
               <a:rPr lang="en-US" sz="3000" dirty="0" err="1"/>
@@ -7803,78 +6857,7 @@
               <a:rPr lang="en-US" sz="3000" dirty="0"/>
               <a:t> ante </a:t>
             </a:r>
-            <a:r>
-              <a:rPr lang="en-US" sz="3000" dirty="0" err="1"/>
-              <a:t>elementum</a:t>
-            </a:r>
-            <a:r>
-              <a:rPr lang="en-US" sz="3000" dirty="0"/>
-              <a:t> ac. </a:t>
-            </a:r>
-            <a:r>
-              <a:rPr lang="en-US" sz="3000" dirty="0" err="1"/>
-              <a:t>Donec</a:t>
-            </a:r>
-            <a:r>
-              <a:rPr lang="en-US" sz="3000" dirty="0"/>
-              <a:t> quam </a:t>
-            </a:r>
-            <a:r>
-              <a:rPr lang="en-US" sz="3000" dirty="0" err="1"/>
-              <a:t>tellus</a:t>
-            </a:r>
-            <a:r>
-              <a:rPr lang="en-US" sz="3000" dirty="0"/>
-              <a:t>, </a:t>
-            </a:r>
-            <a:r>
-              <a:rPr lang="en-US" sz="3000" dirty="0" err="1"/>
-              <a:t>fringilla</a:t>
-            </a:r>
-            <a:r>
-              <a:rPr lang="en-US" sz="3000" dirty="0"/>
-              <a:t> </a:t>
-            </a:r>
-            <a:r>
-              <a:rPr lang="en-US" sz="3000" dirty="0" err="1"/>
-              <a:t>vel</a:t>
-            </a:r>
-            <a:r>
-              <a:rPr lang="en-US" sz="3000" dirty="0"/>
-              <a:t> </a:t>
-            </a:r>
-            <a:r>
-              <a:rPr lang="en-US" sz="3000" dirty="0" err="1"/>
-              <a:t>gravida</a:t>
-            </a:r>
-            <a:r>
-              <a:rPr lang="en-US" sz="3000" dirty="0"/>
-              <a:t> sit </a:t>
-            </a:r>
-            <a:r>
-              <a:rPr lang="en-US" sz="3000" dirty="0" err="1"/>
-              <a:t>amet</a:t>
-            </a:r>
-            <a:r>
-              <a:rPr lang="en-US" sz="3000" dirty="0"/>
-              <a:t>, </a:t>
-            </a:r>
-            <a:r>
-              <a:rPr lang="en-US" sz="3000" dirty="0" err="1"/>
-              <a:t>egestas</a:t>
-            </a:r>
-            <a:r>
-              <a:rPr lang="en-US" sz="3000" dirty="0"/>
-              <a:t> id </a:t>
-            </a:r>
-            <a:r>
-              <a:rPr lang="en-US" sz="3000" dirty="0" err="1"/>
-              <a:t>nulla</a:t>
-            </a:r>
-            <a:r>
-              <a:rPr lang="en-US" sz="3000" dirty="0"/>
-              <a:t>. </a:t>
-            </a:r>
+            <a:endParaRPr lang="en-US" sz="3000" dirty="0"/>
           </a:p>
           <a:p>
             <a:pPr>
@@ -7882,366 +6865,7 @@
                 <a:spcPts val="1800"/>
               </a:spcAft>
             </a:pPr>
-            <a:r>
-              <a:rPr lang="en-US" sz="3000" dirty="0" err="1"/>
-              <a:t>Proin</a:t>
-            </a:r>
-            <a:r>
-              <a:rPr lang="en-US" sz="3000" dirty="0"/>
-              <a:t> </a:t>
-            </a:r>
-            <a:r>
-              <a:rPr lang="en-US" sz="3000" dirty="0" err="1"/>
-              <a:t>eget</a:t>
-            </a:r>
-            <a:r>
-              <a:rPr lang="en-US" sz="3000" dirty="0"/>
-              <a:t> </a:t>
-            </a:r>
-            <a:r>
-              <a:rPr lang="en-US" sz="3000" dirty="0" err="1"/>
-              <a:t>velit</a:t>
-            </a:r>
-            <a:r>
-              <a:rPr lang="en-US" sz="3000" dirty="0"/>
-              <a:t> </a:t>
-            </a:r>
-            <a:r>
-              <a:rPr lang="en-US" sz="3000" dirty="0" err="1"/>
-              <a:t>nisl</a:t>
-            </a:r>
-            <a:r>
-              <a:rPr lang="en-US" sz="3000" dirty="0"/>
-              <a:t>. </a:t>
-            </a:r>
-            <a:r>
-              <a:rPr lang="en-US" sz="3000" dirty="0" err="1"/>
-              <a:t>Morbi</a:t>
-            </a:r>
-            <a:r>
-              <a:rPr lang="en-US" sz="3000" dirty="0"/>
-              <a:t> </a:t>
-            </a:r>
-            <a:r>
-              <a:rPr lang="en-US" sz="3000" dirty="0" err="1"/>
-              <a:t>lacinia</a:t>
-            </a:r>
-            <a:r>
-              <a:rPr lang="en-US" sz="3000" dirty="0"/>
-              <a:t> </a:t>
-            </a:r>
-            <a:r>
-              <a:rPr lang="en-US" sz="3000" dirty="0" err="1"/>
-              <a:t>volutPellentesque</a:t>
-            </a:r>
-            <a:r>
-              <a:rPr lang="en-US" sz="3000" dirty="0"/>
-              <a:t> semper </a:t>
-            </a:r>
-            <a:r>
-              <a:rPr lang="en-US" sz="3000" dirty="0" err="1"/>
-              <a:t>vehicula</a:t>
-            </a:r>
-            <a:r>
-              <a:rPr lang="en-US" sz="3000" dirty="0"/>
-              <a:t> </a:t>
-            </a:r>
-            <a:r>
-              <a:rPr lang="en-US" sz="3000" dirty="0" err="1"/>
-              <a:t>turpis</a:t>
-            </a:r>
-            <a:r>
-              <a:rPr lang="en-US" sz="3000" dirty="0"/>
-              <a:t> </a:t>
-            </a:r>
-            <a:r>
-              <a:rPr lang="en-US" sz="3000" dirty="0" err="1"/>
-              <a:t>facilisis</a:t>
-            </a:r>
-            <a:r>
-              <a:rPr lang="en-US" sz="3000" dirty="0"/>
-              <a:t> </a:t>
-            </a:r>
-            <a:r>
-              <a:rPr lang="en-US" sz="3000" dirty="0" err="1"/>
-              <a:t>interdum</a:t>
-            </a:r>
-            <a:r>
-              <a:rPr lang="en-US" sz="3000" dirty="0"/>
-              <a:t>. </a:t>
-            </a:r>
-            <a:r>
-              <a:rPr lang="en-US" sz="3000" dirty="0" err="1"/>
-              <a:t>Aliquam</a:t>
-            </a:r>
-            <a:r>
-              <a:rPr lang="en-US" sz="3000" dirty="0"/>
-              <a:t> </a:t>
-            </a:r>
-            <a:r>
-              <a:rPr lang="en-US" sz="3000" dirty="0" err="1"/>
-              <a:t>sodales</a:t>
-            </a:r>
-            <a:r>
-              <a:rPr lang="en-US" sz="3000" dirty="0"/>
-              <a:t> </a:t>
-            </a:r>
-            <a:r>
-              <a:rPr lang="en-US" sz="3000" dirty="0" err="1"/>
-              <a:t>purus</a:t>
-            </a:r>
-            <a:r>
-              <a:rPr lang="en-US" sz="3000" dirty="0"/>
-              <a:t> a ligula </a:t>
-            </a:r>
-            <a:r>
-              <a:rPr lang="en-US" sz="3000" dirty="0" err="1"/>
-              <a:t>venenatis</a:t>
-            </a:r>
-            <a:r>
-              <a:rPr lang="en-US" sz="3000" dirty="0"/>
-              <a:t> id </a:t>
-            </a:r>
-            <a:r>
-              <a:rPr lang="en-US" sz="3000" dirty="0" err="1"/>
-              <a:t>imperdiet</a:t>
-            </a:r>
-            <a:r>
-              <a:rPr lang="en-US" sz="3000" dirty="0"/>
-              <a:t> </a:t>
-            </a:r>
-            <a:r>
-              <a:rPr lang="en-US" sz="3000" dirty="0" err="1"/>
-              <a:t>sem</a:t>
-            </a:r>
-            <a:r>
-              <a:rPr lang="en-US" sz="3000" dirty="0"/>
-              <a:t> </a:t>
-            </a:r>
-            <a:r>
-              <a:rPr lang="en-US" sz="3000" dirty="0" err="1"/>
-              <a:t>posuere</a:t>
-            </a:r>
-            <a:r>
-              <a:rPr lang="en-US" sz="3000" dirty="0"/>
-              <a:t>. </a:t>
-            </a:r>
-            <a:r>
-              <a:rPr lang="en-US" sz="3000" dirty="0" err="1"/>
-              <a:t>Proin</a:t>
-            </a:r>
-            <a:r>
-              <a:rPr lang="en-US" sz="3000" dirty="0"/>
-              <a:t> in </a:t>
-            </a:r>
-            <a:r>
-              <a:rPr lang="en-US" sz="3000" dirty="0" err="1"/>
-              <a:t>imperdiet</a:t>
-            </a:r>
-            <a:r>
-              <a:rPr lang="en-US" sz="3000" dirty="0"/>
-              <a:t> </a:t>
-            </a:r>
-            <a:r>
-              <a:rPr lang="en-US" sz="3000" dirty="0" err="1"/>
-              <a:t>neque</a:t>
-            </a:r>
-            <a:r>
-              <a:rPr lang="en-US" sz="3000" dirty="0"/>
-              <a:t>. </a:t>
-            </a:r>
-            <a:r>
-              <a:rPr lang="en-US" sz="3000" dirty="0" err="1"/>
-              <a:t>Pellentesque</a:t>
-            </a:r>
-            <a:r>
-              <a:rPr lang="en-US" sz="3000" dirty="0"/>
-              <a:t> </a:t>
-            </a:r>
-            <a:r>
-              <a:rPr lang="en-US" sz="3000" dirty="0" err="1"/>
-              <a:t>nec</a:t>
-            </a:r>
-            <a:r>
-              <a:rPr lang="en-US" sz="3000" dirty="0"/>
-              <a:t> </a:t>
-            </a:r>
-            <a:r>
-              <a:rPr lang="en-US" sz="3000" dirty="0" err="1"/>
-              <a:t>malesuada</a:t>
-            </a:r>
-            <a:r>
-              <a:rPr lang="en-US" sz="3000" dirty="0"/>
-              <a:t> </a:t>
-            </a:r>
-            <a:r>
-              <a:rPr lang="en-US" sz="3000" dirty="0" err="1"/>
-              <a:t>erat</a:t>
-            </a:r>
-            <a:r>
-              <a:rPr lang="en-US" sz="3000" dirty="0"/>
-              <a:t>. </a:t>
-            </a:r>
-            <a:r>
-              <a:rPr lang="en-US" sz="3000" dirty="0" err="1"/>
-              <a:t>Praesent</a:t>
-            </a:r>
-            <a:r>
-              <a:rPr lang="en-US" sz="3000" dirty="0"/>
-              <a:t> </a:t>
-            </a:r>
-            <a:r>
-              <a:rPr lang="en-US" sz="3000" dirty="0" err="1"/>
-              <a:t>aliquam</a:t>
-            </a:r>
-            <a:r>
-              <a:rPr lang="en-US" sz="3000" dirty="0"/>
-              <a:t>, </a:t>
-            </a:r>
-            <a:r>
-              <a:rPr lang="en-US" sz="3000" dirty="0" err="1"/>
-              <a:t>augue</a:t>
-            </a:r>
-            <a:r>
-              <a:rPr lang="en-US" sz="3000" dirty="0"/>
-              <a:t> non </a:t>
-            </a:r>
-            <a:r>
-              <a:rPr lang="en-US" sz="3000" dirty="0" err="1"/>
-              <a:t>pharetra</a:t>
-            </a:r>
-            <a:r>
-              <a:rPr lang="en-US" sz="3000" dirty="0"/>
-              <a:t> </a:t>
-            </a:r>
-            <a:r>
-              <a:rPr lang="en-US" sz="3000" dirty="0" err="1"/>
-              <a:t>laoreet</a:t>
-            </a:r>
-            <a:r>
-              <a:rPr lang="en-US" sz="3000" dirty="0"/>
-              <a:t>, </a:t>
-            </a:r>
-            <a:r>
-              <a:rPr lang="en-US" sz="3000" dirty="0" err="1"/>
-              <a:t>ipsum</a:t>
-            </a:r>
-            <a:r>
-              <a:rPr lang="en-US" sz="3000" dirty="0"/>
-              <a:t> </a:t>
-            </a:r>
-            <a:r>
-              <a:rPr lang="en-US" sz="3000" dirty="0" err="1"/>
-              <a:t>sem</a:t>
-            </a:r>
-            <a:r>
-              <a:rPr lang="en-US" sz="3000" dirty="0"/>
-              <a:t> </a:t>
-            </a:r>
-            <a:r>
-              <a:rPr lang="en-US" sz="3000" dirty="0" err="1"/>
-              <a:t>vulputate</a:t>
-            </a:r>
-            <a:r>
-              <a:rPr lang="en-US" sz="3000" dirty="0"/>
-              <a:t> dolor, in </a:t>
-            </a:r>
-            <a:r>
-              <a:rPr lang="en-US" sz="3000" dirty="0" err="1"/>
-              <a:t>pulvinar</a:t>
-            </a:r>
-            <a:r>
-              <a:rPr lang="en-US" sz="3000" dirty="0"/>
-              <a:t> </a:t>
-            </a:r>
-            <a:r>
-              <a:rPr lang="en-US" sz="3000" dirty="0" err="1"/>
-              <a:t>tortor</a:t>
-            </a:r>
-            <a:r>
-              <a:rPr lang="en-US" sz="3000" dirty="0"/>
-              <a:t> mi at </a:t>
-            </a:r>
-            <a:r>
-              <a:rPr lang="en-US" sz="3000" dirty="0" err="1"/>
-              <a:t>purus</a:t>
-            </a:r>
-            <a:r>
-              <a:rPr lang="en-US" sz="3000" dirty="0"/>
-              <a:t>. </a:t>
-            </a:r>
-            <a:r>
-              <a:rPr lang="en-US" sz="3000" dirty="0" err="1"/>
-              <a:t>Nulla</a:t>
-            </a:r>
-            <a:r>
-              <a:rPr lang="en-US" sz="3000" dirty="0"/>
-              <a:t> </a:t>
-            </a:r>
-            <a:r>
-              <a:rPr lang="en-US" sz="3000" dirty="0" err="1"/>
-              <a:t>facilisi</a:t>
-            </a:r>
-            <a:r>
-              <a:rPr lang="en-US" sz="3000" dirty="0"/>
-              <a:t>. </a:t>
-            </a:r>
-            <a:r>
-              <a:rPr lang="en-US" sz="3000" dirty="0" err="1"/>
-              <a:t>Nunc</a:t>
-            </a:r>
-            <a:r>
-              <a:rPr lang="en-US" sz="3000" dirty="0"/>
-              <a:t> ac </a:t>
-            </a:r>
-            <a:r>
-              <a:rPr lang="en-US" sz="3000" dirty="0" err="1"/>
-              <a:t>odio</a:t>
-            </a:r>
-            <a:r>
-              <a:rPr lang="en-US" sz="3000" dirty="0"/>
-              <a:t> in </a:t>
-            </a:r>
-            <a:r>
-              <a:rPr lang="en-US" sz="3000" dirty="0" err="1"/>
-              <a:t>risus</a:t>
-            </a:r>
-            <a:r>
-              <a:rPr lang="en-US" sz="3000" dirty="0"/>
-              <a:t> </a:t>
-            </a:r>
-            <a:r>
-              <a:rPr lang="en-US" sz="3000" dirty="0" err="1"/>
-              <a:t>tristique</a:t>
-            </a:r>
-            <a:r>
-              <a:rPr lang="en-US" sz="3000" dirty="0"/>
-              <a:t> </a:t>
-            </a:r>
-            <a:r>
-              <a:rPr lang="en-US" sz="3000" dirty="0" err="1"/>
-              <a:t>commodo</a:t>
-            </a:r>
-            <a:r>
-              <a:rPr lang="en-US" sz="3000" dirty="0"/>
-              <a:t> a </a:t>
-            </a:r>
-            <a:r>
-              <a:rPr lang="en-US" sz="3000" dirty="0" err="1"/>
-              <a:t>eget</a:t>
-            </a:r>
-            <a:r>
-              <a:rPr lang="en-US" sz="3000" dirty="0"/>
-              <a:t> </a:t>
-            </a:r>
-            <a:r>
-              <a:rPr lang="en-US" sz="3000" dirty="0" err="1"/>
-              <a:t>massa</a:t>
-            </a:r>
-            <a:r>
-              <a:rPr lang="en-US" sz="3000" dirty="0"/>
-              <a:t>. </a:t>
-            </a:r>
+            <a:endParaRPr lang="en-US" sz="3000" dirty="0"/>
           </a:p>
           <a:p>
             <a:pPr>
@@ -8265,288 +6889,116 @@
               </a:spcAft>
             </a:pPr>
             <a:r>
-              <a:rPr lang="en-US" sz="3000" dirty="0" err="1"/>
-              <a:t>Urna</a:t>
-            </a:r>
-            <a:r>
-              <a:rPr lang="en-US" sz="3000" dirty="0"/>
-              <a:t> </a:t>
-            </a:r>
-            <a:r>
-              <a:rPr lang="en-US" sz="3000" dirty="0" err="1"/>
-              <a:t>aliquet</a:t>
-            </a:r>
-            <a:r>
-              <a:rPr lang="en-US" sz="3000" dirty="0"/>
-              <a:t> </a:t>
-            </a:r>
-            <a:r>
-              <a:rPr lang="en-US" sz="3000" dirty="0" err="1"/>
-              <a:t>mattis</a:t>
-            </a:r>
-            <a:r>
-              <a:rPr lang="en-US" sz="3000" dirty="0"/>
-              <a:t>. </a:t>
-            </a:r>
-            <a:r>
-              <a:rPr lang="en-US" sz="3000" dirty="0" err="1"/>
-              <a:t>Nunc</a:t>
-            </a:r>
-            <a:r>
-              <a:rPr lang="en-US" sz="3000" dirty="0"/>
-              <a:t> </a:t>
-            </a:r>
-            <a:r>
-              <a:rPr lang="en-US" sz="3000" dirty="0" err="1"/>
-              <a:t>quis</a:t>
-            </a:r>
-            <a:r>
-              <a:rPr lang="en-US" sz="3000" dirty="0"/>
-              <a:t> </a:t>
-            </a:r>
-            <a:r>
-              <a:rPr lang="en-US" sz="3000" dirty="0" err="1"/>
-              <a:t>enim</a:t>
-            </a:r>
-            <a:r>
-              <a:rPr lang="en-US" sz="3000" dirty="0"/>
-              <a:t> </a:t>
-            </a:r>
-            <a:r>
-              <a:rPr lang="en-US" sz="3000" dirty="0" err="1"/>
-              <a:t>lorem</a:t>
-            </a:r>
-            <a:r>
-              <a:rPr lang="en-US" sz="3000" dirty="0"/>
-              <a:t>, </a:t>
-            </a:r>
-            <a:r>
-              <a:rPr lang="en-US" sz="3000" dirty="0" err="1"/>
-              <a:t>aliquam</a:t>
-            </a:r>
-            <a:r>
-              <a:rPr lang="en-US" sz="3000" dirty="0"/>
-              <a:t> </a:t>
-            </a:r>
-            <a:r>
-              <a:rPr lang="en-US" sz="3000" dirty="0" err="1"/>
-              <a:t>consectetur</a:t>
-            </a:r>
-            <a:r>
-              <a:rPr lang="en-US" sz="3000" dirty="0"/>
-              <a:t> </a:t>
-            </a:r>
-            <a:r>
-              <a:rPr lang="en-US" sz="3000" dirty="0" err="1"/>
-              <a:t>justo</a:t>
-            </a:r>
-            <a:r>
-              <a:rPr lang="en-US" sz="3000" dirty="0"/>
-              <a:t>. </a:t>
-            </a:r>
-            <a:r>
-              <a:rPr lang="en-US" sz="3000" dirty="0" err="1"/>
-              <a:t>Ut</a:t>
-            </a:r>
-            <a:r>
-              <a:rPr lang="en-US" sz="3000" dirty="0"/>
-              <a:t> </a:t>
-            </a:r>
-            <a:r>
-              <a:rPr lang="en-US" sz="3000" dirty="0" err="1"/>
-              <a:t>interdum</a:t>
-            </a:r>
-            <a:r>
-              <a:rPr lang="en-US" sz="3000" dirty="0"/>
-              <a:t> </a:t>
-            </a:r>
-            <a:r>
-              <a:rPr lang="en-US" sz="3000" dirty="0" err="1"/>
-              <a:t>facilisis</a:t>
-            </a:r>
-            <a:r>
-              <a:rPr lang="en-US" sz="3000" dirty="0"/>
-              <a:t> ante </a:t>
-            </a:r>
-            <a:r>
-              <a:rPr lang="en-US" sz="3000" dirty="0" err="1"/>
-              <a:t>luctus</a:t>
-            </a:r>
-            <a:r>
-              <a:rPr lang="en-US" sz="3000" dirty="0"/>
-              <a:t> </a:t>
-            </a:r>
-            <a:r>
-              <a:rPr lang="en-US" sz="3000" dirty="0" err="1"/>
-              <a:t>tincidunt</a:t>
-            </a:r>
-            <a:r>
-              <a:rPr lang="en-US" sz="3000" dirty="0"/>
-              <a:t>. </a:t>
-            </a:r>
-            <a:r>
-              <a:rPr lang="en-US" sz="3000" dirty="0" err="1"/>
-              <a:t>Aenean</a:t>
-            </a:r>
-            <a:r>
-              <a:rPr lang="en-US" sz="3000" dirty="0"/>
-              <a:t> vitae </a:t>
-            </a:r>
-            <a:r>
-              <a:rPr lang="en-US" sz="3000" dirty="0" err="1"/>
-              <a:t>sapien</a:t>
-            </a:r>
-            <a:r>
-              <a:rPr lang="en-US" sz="3000" dirty="0"/>
-              <a:t> </a:t>
-            </a:r>
-            <a:r>
-              <a:rPr lang="en-US" sz="3000" dirty="0" err="1"/>
-              <a:t>nulla</a:t>
-            </a:r>
-            <a:r>
-              <a:rPr lang="en-US" sz="3000" dirty="0"/>
-              <a:t>, </a:t>
-            </a:r>
-            <a:r>
-              <a:rPr lang="en-US" sz="3000" dirty="0" err="1"/>
-              <a:t>sed</a:t>
-            </a:r>
-            <a:r>
-              <a:rPr lang="en-US" sz="3000" dirty="0"/>
-              <a:t> dictum dui. </a:t>
-            </a:r>
-            <a:r>
-              <a:rPr lang="en-US" sz="3000" dirty="0" err="1"/>
-              <a:t>Morbi</a:t>
-            </a:r>
-            <a:r>
-              <a:rPr lang="en-US" sz="3000" dirty="0"/>
-              <a:t> </a:t>
-            </a:r>
-            <a:r>
-              <a:rPr lang="en-US" sz="3000" dirty="0" err="1"/>
-              <a:t>diam</a:t>
-            </a:r>
-            <a:r>
-              <a:rPr lang="en-US" sz="3000" dirty="0"/>
-              <a:t> </a:t>
-            </a:r>
-            <a:r>
-              <a:rPr lang="en-US" sz="3000" dirty="0" err="1"/>
-              <a:t>lectus</a:t>
-            </a:r>
-            <a:r>
-              <a:rPr lang="en-US" sz="3000" dirty="0"/>
-              <a:t>, </a:t>
-            </a:r>
-            <a:r>
-              <a:rPr lang="en-US" sz="3000" dirty="0" err="1"/>
-              <a:t>porta</a:t>
-            </a:r>
-            <a:r>
-              <a:rPr lang="en-US" sz="3000" dirty="0"/>
-              <a:t> id </a:t>
-            </a:r>
-            <a:r>
-              <a:rPr lang="en-US" sz="3000" dirty="0" err="1"/>
-              <a:t>malesuada</a:t>
-            </a:r>
-            <a:r>
-              <a:rPr lang="en-US" sz="3000" dirty="0"/>
-              <a:t> </a:t>
-            </a:r>
-            <a:r>
-              <a:rPr lang="en-US" sz="3000" dirty="0" err="1"/>
-              <a:t>eu</a:t>
-            </a:r>
-            <a:r>
-              <a:rPr lang="en-US" sz="3000" dirty="0"/>
-              <a:t>, </a:t>
-            </a:r>
-            <a:r>
-              <a:rPr lang="en-US" sz="3000" dirty="0" err="1"/>
-              <a:t>consequat</a:t>
-            </a:r>
-            <a:r>
-              <a:rPr lang="en-US" sz="3000" dirty="0"/>
-              <a:t> a ante. </a:t>
-            </a:r>
-            <a:r>
-              <a:rPr lang="en-US" sz="3000" dirty="0" err="1"/>
-              <a:t>Nullam</a:t>
-            </a:r>
-            <a:r>
-              <a:rPr lang="en-US" sz="3000" dirty="0"/>
-              <a:t> vitae </a:t>
-            </a:r>
-            <a:r>
-              <a:rPr lang="en-US" sz="3000" dirty="0" err="1"/>
-              <a:t>varius</a:t>
-            </a:r>
-            <a:r>
-              <a:rPr lang="en-US" sz="3000" dirty="0"/>
-              <a:t> est. </a:t>
-            </a:r>
-            <a:r>
-              <a:rPr lang="en-US" sz="3000" dirty="0" err="1"/>
-              <a:t>Vivamus</a:t>
-            </a:r>
-            <a:r>
-              <a:rPr lang="en-US" sz="3000" dirty="0"/>
-              <a:t> ac </a:t>
-            </a:r>
-            <a:r>
-              <a:rPr lang="en-US" sz="3000" dirty="0" err="1"/>
-              <a:t>libero</a:t>
-            </a:r>
-            <a:r>
-              <a:rPr lang="en-US" sz="3000" dirty="0"/>
-              <a:t> </a:t>
-            </a:r>
-            <a:r>
-              <a:rPr lang="en-US" sz="3000" dirty="0" err="1"/>
-              <a:t>ut</a:t>
-            </a:r>
-            <a:r>
-              <a:rPr lang="en-US" sz="3000" dirty="0"/>
-              <a:t> </a:t>
-            </a:r>
-            <a:r>
-              <a:rPr lang="en-US" sz="3000" dirty="0" err="1"/>
-              <a:t>arcu</a:t>
-            </a:r>
-            <a:r>
-              <a:rPr lang="en-US" sz="3000" dirty="0"/>
-              <a:t> </a:t>
-            </a:r>
-            <a:r>
-              <a:rPr lang="en-US" sz="3000" dirty="0" err="1"/>
-              <a:t>accumsan</a:t>
-            </a:r>
-            <a:r>
-              <a:rPr lang="en-US" sz="3000" dirty="0"/>
-              <a:t> </a:t>
-            </a:r>
-            <a:r>
-              <a:rPr lang="en-US" sz="3000" dirty="0" err="1"/>
-              <a:t>convallis</a:t>
-            </a:r>
-            <a:r>
-              <a:rPr lang="en-US" sz="3000" dirty="0"/>
-              <a:t> vitae </a:t>
-            </a:r>
-            <a:r>
-              <a:rPr lang="en-US" sz="3000" dirty="0" err="1"/>
-              <a:t>vel</a:t>
-            </a:r>
-            <a:r>
-              <a:rPr lang="en-US" sz="3000" dirty="0"/>
-              <a:t> </a:t>
-            </a:r>
-            <a:r>
-              <a:rPr lang="en-US" sz="3000" dirty="0" err="1"/>
-              <a:t>leo</a:t>
+              <a:rPr lang="en-US" sz="3000" dirty="0"/>
+              <a:t>The external interface we will be working with is a DJI </a:t>
+            </a:r>
+            <a:r>
+              <a:rPr lang="en-US" sz="3000" dirty="0" err="1"/>
+              <a:t>FlameWheel</a:t>
+            </a:r>
+            <a:r>
+              <a:rPr lang="en-US" sz="3000" dirty="0"/>
+              <a:t> 550 </a:t>
+            </a:r>
+            <a:r>
+              <a:rPr lang="en-US" sz="3000" dirty="0" err="1"/>
+              <a:t>HexCopter</a:t>
+            </a:r>
+            <a:r>
+              <a:rPr lang="en-US" sz="3000" dirty="0" smtClean="0"/>
+              <a:t>. Included </a:t>
+            </a:r>
+            <a:r>
+              <a:rPr lang="en-US" sz="3000" dirty="0"/>
+              <a:t>on it is a </a:t>
+            </a:r>
+            <a:r>
+              <a:rPr lang="en-US" sz="3000" dirty="0" err="1"/>
+              <a:t>Beaglebone</a:t>
+            </a:r>
+            <a:r>
+              <a:rPr lang="en-US" sz="3000" dirty="0"/>
+              <a:t> Black with a </a:t>
+            </a:r>
+            <a:r>
+              <a:rPr lang="en-US" sz="3000" dirty="0" err="1"/>
+              <a:t>PixHawk</a:t>
+            </a:r>
+            <a:r>
+              <a:rPr lang="en-US" sz="3000" dirty="0"/>
+              <a:t> v1.6 </a:t>
+            </a:r>
+            <a:r>
+              <a:rPr lang="en-US" sz="3000" dirty="0" smtClean="0"/>
+              <a:t>Fire cape </a:t>
+            </a:r>
+            <a:r>
+              <a:rPr lang="en-US" sz="3000" dirty="0"/>
+              <a:t>mounted on </a:t>
+            </a:r>
+            <a:r>
+              <a:rPr lang="en-US" sz="3000" dirty="0" err="1"/>
+              <a:t>it.The</a:t>
+            </a:r>
+            <a:r>
+              <a:rPr lang="en-US" sz="3000" dirty="0"/>
+              <a:t> </a:t>
+            </a:r>
+            <a:r>
+              <a:rPr lang="en-US" sz="3000" dirty="0" err="1"/>
+              <a:t>PixHawk</a:t>
+            </a:r>
+            <a:r>
+              <a:rPr lang="en-US" sz="3000" dirty="0"/>
+              <a:t> has a number of sensors, and interfaces directly with our 3DR GPS mounted unit. There is </a:t>
+            </a:r>
+            <a:r>
+              <a:rPr lang="en-US" sz="3000" dirty="0" smtClean="0"/>
+              <a:t>also a </a:t>
+            </a:r>
+            <a:r>
+              <a:rPr lang="en-US" sz="3000" dirty="0"/>
+              <a:t>controller which communicates with the drone over 2.5 </a:t>
+            </a:r>
+            <a:r>
+              <a:rPr lang="en-US" sz="3000" dirty="0" err="1"/>
+              <a:t>Ghz</a:t>
+            </a:r>
+            <a:r>
+              <a:rPr lang="en-US" sz="3000" dirty="0"/>
+              <a:t> RF, along with a 900 </a:t>
+            </a:r>
+            <a:r>
+              <a:rPr lang="en-US" sz="3000" dirty="0" err="1"/>
+              <a:t>Mhz</a:t>
+            </a:r>
+            <a:r>
+              <a:rPr lang="en-US" sz="3000" dirty="0"/>
+              <a:t> </a:t>
+            </a:r>
+            <a:r>
+              <a:rPr lang="en-US" sz="3000" dirty="0" err="1"/>
+              <a:t>MAVLink</a:t>
+            </a:r>
+            <a:r>
+              <a:rPr lang="en-US" sz="3000" dirty="0"/>
+              <a:t> </a:t>
+            </a:r>
+            <a:r>
+              <a:rPr lang="en-US" sz="3000" dirty="0" smtClean="0"/>
+              <a:t>telemetry radio</a:t>
+            </a:r>
+            <a:r>
+              <a:rPr lang="en-US" sz="3000" dirty="0"/>
+              <a:t>, that communicates with our ground station. The ground station is a computer running Mission Planner</a:t>
+            </a:r>
+            <a:r>
+              <a:rPr lang="en-US" sz="3000" dirty="0" smtClean="0"/>
+              <a:t>, a mission </a:t>
+            </a:r>
+            <a:r>
+              <a:rPr lang="en-US" sz="3000" dirty="0"/>
+              <a:t>control software that allows us to define flight paths, and read telemetry data from the drone.</a:t>
             </a:r>
             <a:endParaRPr lang="en-US" sz="3000" dirty="0"/>
           </a:p>

</xml_diff>